<commit_message>
Correct screen clear image
</commit_message>
<xml_diff>
--- a/Specification/Editable source images/Images Spec Part 4 - GPU.pptx
+++ b/Specification/Editable source images/Images Spec Part 4 - GPU.pptx
@@ -298,7 +298,7 @@
             <a:fld id="{58855999-87E7-4646-BE91-91594D40D108}" type="datetimeFigureOut">
               <a:rPr lang="es-ES" smtClean="0"/>
               <a:pPr/>
-              <a:t>20/11/2022</a:t>
+              <a:t>30/11/2022</a:t>
             </a:fld>
             <a:endParaRPr lang="es-ES"/>
           </a:p>
@@ -465,7 +465,7 @@
             <a:fld id="{58855999-87E7-4646-BE91-91594D40D108}" type="datetimeFigureOut">
               <a:rPr lang="es-ES" smtClean="0"/>
               <a:pPr/>
-              <a:t>20/11/2022</a:t>
+              <a:t>30/11/2022</a:t>
             </a:fld>
             <a:endParaRPr lang="es-ES"/>
           </a:p>
@@ -642,7 +642,7 @@
             <a:fld id="{58855999-87E7-4646-BE91-91594D40D108}" type="datetimeFigureOut">
               <a:rPr lang="es-ES" smtClean="0"/>
               <a:pPr/>
-              <a:t>20/11/2022</a:t>
+              <a:t>30/11/2022</a:t>
             </a:fld>
             <a:endParaRPr lang="es-ES"/>
           </a:p>
@@ -809,7 +809,7 @@
             <a:fld id="{58855999-87E7-4646-BE91-91594D40D108}" type="datetimeFigureOut">
               <a:rPr lang="es-ES" smtClean="0"/>
               <a:pPr/>
-              <a:t>20/11/2022</a:t>
+              <a:t>30/11/2022</a:t>
             </a:fld>
             <a:endParaRPr lang="es-ES"/>
           </a:p>
@@ -1052,7 +1052,7 @@
             <a:fld id="{58855999-87E7-4646-BE91-91594D40D108}" type="datetimeFigureOut">
               <a:rPr lang="es-ES" smtClean="0"/>
               <a:pPr/>
-              <a:t>20/11/2022</a:t>
+              <a:t>30/11/2022</a:t>
             </a:fld>
             <a:endParaRPr lang="es-ES"/>
           </a:p>
@@ -1337,7 +1337,7 @@
             <a:fld id="{58855999-87E7-4646-BE91-91594D40D108}" type="datetimeFigureOut">
               <a:rPr lang="es-ES" smtClean="0"/>
               <a:pPr/>
-              <a:t>20/11/2022</a:t>
+              <a:t>30/11/2022</a:t>
             </a:fld>
             <a:endParaRPr lang="es-ES"/>
           </a:p>
@@ -1756,7 +1756,7 @@
             <a:fld id="{58855999-87E7-4646-BE91-91594D40D108}" type="datetimeFigureOut">
               <a:rPr lang="es-ES" smtClean="0"/>
               <a:pPr/>
-              <a:t>20/11/2022</a:t>
+              <a:t>30/11/2022</a:t>
             </a:fld>
             <a:endParaRPr lang="es-ES"/>
           </a:p>
@@ -1871,7 +1871,7 @@
             <a:fld id="{58855999-87E7-4646-BE91-91594D40D108}" type="datetimeFigureOut">
               <a:rPr lang="es-ES" smtClean="0"/>
               <a:pPr/>
-              <a:t>20/11/2022</a:t>
+              <a:t>30/11/2022</a:t>
             </a:fld>
             <a:endParaRPr lang="es-ES"/>
           </a:p>
@@ -1963,7 +1963,7 @@
             <a:fld id="{58855999-87E7-4646-BE91-91594D40D108}" type="datetimeFigureOut">
               <a:rPr lang="es-ES" smtClean="0"/>
               <a:pPr/>
-              <a:t>20/11/2022</a:t>
+              <a:t>30/11/2022</a:t>
             </a:fld>
             <a:endParaRPr lang="es-ES"/>
           </a:p>
@@ -2237,7 +2237,7 @@
             <a:fld id="{58855999-87E7-4646-BE91-91594D40D108}" type="datetimeFigureOut">
               <a:rPr lang="es-ES" smtClean="0"/>
               <a:pPr/>
-              <a:t>20/11/2022</a:t>
+              <a:t>30/11/2022</a:t>
             </a:fld>
             <a:endParaRPr lang="es-ES"/>
           </a:p>
@@ -2487,7 +2487,7 @@
             <a:fld id="{58855999-87E7-4646-BE91-91594D40D108}" type="datetimeFigureOut">
               <a:rPr lang="es-ES" smtClean="0"/>
               <a:pPr/>
-              <a:t>20/11/2022</a:t>
+              <a:t>30/11/2022</a:t>
             </a:fld>
             <a:endParaRPr lang="es-ES"/>
           </a:p>
@@ -2697,7 +2697,7 @@
             <a:fld id="{58855999-87E7-4646-BE91-91594D40D108}" type="datetimeFigureOut">
               <a:rPr lang="es-ES" smtClean="0"/>
               <a:pPr/>
-              <a:t>20/11/2022</a:t>
+              <a:t>30/11/2022</a:t>
             </a:fld>
             <a:endParaRPr lang="es-ES"/>
           </a:p>
@@ -5543,7 +5543,7 @@
             <p:cNvPr id="41" name="CuadroTexto 19">
               <a:extLst>
                 <a:ext uri="{FF2B5EF4-FFF2-40B4-BE49-F238E27FC236}">
-                  <a16:creationId xmlns:a16="http://schemas.microsoft.com/office/drawing/2014/main" xmlns="" id="{B81A97C9-B44A-4DCA-962F-3BB6FD3A6362}"/>
+                  <a16:creationId xmlns="" xmlns:a16="http://schemas.microsoft.com/office/drawing/2014/main" id="{B81A97C9-B44A-4DCA-962F-3BB6FD3A6362}"/>
                 </a:ext>
               </a:extLst>
             </p:cNvPr>
@@ -5927,7 +5927,7 @@
             </a:avLst>
           </a:prstGeom>
           <a:solidFill>
-            <a:schemeClr val="bg2">
+            <a:schemeClr val="bg1">
               <a:lumMod val="75000"/>
             </a:schemeClr>
           </a:solidFill>
@@ -6080,10 +6080,7 @@
             <a:avLst/>
           </a:prstGeom>
           <a:solidFill>
-            <a:schemeClr val="accent6">
-              <a:lumMod val="40000"/>
-              <a:lumOff val="60000"/>
-            </a:schemeClr>
+            <a:srgbClr val="C5E0B4"/>
           </a:solidFill>
           <a:ln w="57150"/>
         </p:spPr>
@@ -6208,10 +6205,7 @@
             <a:avLst/>
           </a:prstGeom>
           <a:solidFill>
-            <a:schemeClr val="accent6">
-              <a:lumMod val="40000"/>
-              <a:lumOff val="60000"/>
-            </a:schemeClr>
+            <a:srgbClr val="C5E0B4"/>
           </a:solidFill>
           <a:ln w="38100">
             <a:solidFill>

</xml_diff>